<commit_message>
Updated Poster with Gamestate info
</commit_message>
<xml_diff>
--- a/SyrmaPoster.pptx
+++ b/SyrmaPoster.pptx
@@ -243,7 +243,7 @@
             <a:fld id="{9CF59EBC-EC05-6B4D-B166-DDFA6A1EDCB6}" type="datetimeFigureOut">
               <a:rPr lang="en-US" smtClean="0"/>
               <a:pPr/>
-              <a:t>03/13/2019</a:t>
+              <a:t>03/14/2019</a:t>
             </a:fld>
             <a:endParaRPr lang="en-US" dirty="0"/>
           </a:p>
@@ -3840,6 +3840,72 @@
               <a:latin typeface="Verdana" panose="020B0604030504040204" pitchFamily="34" charset="0"/>
               <a:ea typeface="Verdana" panose="020B0604030504040204" pitchFamily="34" charset="0"/>
             </a:endParaRPr>
+          </a:p>
+        </p:txBody>
+      </p:sp>
+      <p:sp>
+        <p:nvSpPr>
+          <p:cNvPr id="2" name="Rectangle 1">
+            <a:extLst>
+              <a:ext uri="{FF2B5EF4-FFF2-40B4-BE49-F238E27FC236}">
+                <a16:creationId xmlns:a16="http://schemas.microsoft.com/office/drawing/2014/main" id="{82558483-6800-4C48-9F77-4A25E0764C63}"/>
+              </a:ext>
+            </a:extLst>
+          </p:cNvPr>
+          <p:cNvSpPr/>
+          <p:nvPr/>
+        </p:nvSpPr>
+        <p:spPr>
+          <a:xfrm>
+            <a:off x="1798110" y="6503538"/>
+            <a:ext cx="8475057" cy="19728478"/>
+          </a:xfrm>
+          <a:prstGeom prst="rect">
+            <a:avLst/>
+          </a:prstGeom>
+        </p:spPr>
+        <p:txBody>
+          <a:bodyPr wrap="square">
+            <a:spAutoFit/>
+          </a:bodyPr>
+          <a:lstStyle/>
+          <a:p>
+            <a:r>
+              <a:rPr lang="en-US" sz="5800"/>
+              <a:t>The </a:t>
+            </a:r>
+            <a:r>
+              <a:rPr lang="en-US" sz="5800" dirty="0" err="1"/>
+              <a:t>Gamestate</a:t>
+            </a:r>
+            <a:r>
+              <a:rPr lang="en-US" sz="5800" dirty="0"/>
+              <a:t> has a separate function for each primary verb that can be used in our game. The command from the parser is then compared using the </a:t>
+            </a:r>
+            <a:r>
+              <a:rPr lang="en-US" sz="5800" dirty="0" err="1"/>
+              <a:t>doCommand</a:t>
+            </a:r>
+            <a:r>
+              <a:rPr lang="en-US" sz="5800" dirty="0"/>
+              <a:t> function implemented in game.cpp. Each verb is implemented in its own function that will alter the </a:t>
+            </a:r>
+            <a:r>
+              <a:rPr lang="en-US" sz="5800" dirty="0" err="1"/>
+              <a:t>Gamestate</a:t>
+            </a:r>
+            <a:r>
+              <a:rPr lang="en-US" sz="5800" dirty="0"/>
+              <a:t> depending on current player location, as well as rooms or items included in the command. 17 different verbs are able to be understood by the parser: help, </a:t>
+            </a:r>
+            <a:r>
+              <a:rPr lang="en-US" sz="5800" dirty="0" err="1"/>
+              <a:t>savegame</a:t>
+            </a:r>
+            <a:r>
+              <a:rPr lang="en-US" sz="5800" dirty="0"/>
+              <a:t>, inventory, look at, look, take, cut, move toward, sneak, put, drop, crush, combine, give, use, fix and exit.</a:t>
+            </a:r>
           </a:p>
         </p:txBody>
       </p:sp>

</xml_diff>